<commit_message>
Last Update 24-07-2019 17:02:25.91
</commit_message>
<xml_diff>
--- a/Presentations/Unit 2/CS8392-U2-8-ArrayList.pptx
+++ b/Presentations/Unit 2/CS8392-U2-8-ArrayList.pptx
@@ -10,8 +10,8 @@
   <p:sldIdLst>
     <p:sldId id="256" r:id="rId2"/>
     <p:sldId id="286" r:id="rId3"/>
-    <p:sldId id="289" r:id="rId4"/>
-    <p:sldId id="287" r:id="rId5"/>
+    <p:sldId id="292" r:id="rId4"/>
+    <p:sldId id="289" r:id="rId5"/>
     <p:sldId id="288" r:id="rId6"/>
     <p:sldId id="290" r:id="rId7"/>
     <p:sldId id="272" r:id="rId8"/>
@@ -199,7 +199,7 @@
             <a:fld id="{9515075B-F3F0-4441-A1BD-B7B515B708FF}" type="datetimeFigureOut">
               <a:rPr lang="en-US" smtClean="0"/>
               <a:pPr/>
-              <a:t>8/11/2018</a:t>
+              <a:t>7/12/2019</a:t>
             </a:fld>
             <a:endParaRPr lang="en-US"/>
           </a:p>
@@ -654,7 +654,7 @@
             <a:fld id="{6E658DF8-B8C0-4C7F-85EB-B53A2DDD44A9}" type="datetimeFigureOut">
               <a:rPr lang="en-US" smtClean="0"/>
               <a:pPr/>
-              <a:t>8/11/2018</a:t>
+              <a:t>7/12/2019</a:t>
             </a:fld>
             <a:endParaRPr lang="en-US"/>
           </a:p>
@@ -821,7 +821,7 @@
             <a:fld id="{6E658DF8-B8C0-4C7F-85EB-B53A2DDD44A9}" type="datetimeFigureOut">
               <a:rPr lang="en-US" smtClean="0"/>
               <a:pPr/>
-              <a:t>8/11/2018</a:t>
+              <a:t>7/12/2019</a:t>
             </a:fld>
             <a:endParaRPr lang="en-US"/>
           </a:p>
@@ -998,7 +998,7 @@
             <a:fld id="{6E658DF8-B8C0-4C7F-85EB-B53A2DDD44A9}" type="datetimeFigureOut">
               <a:rPr lang="en-US" smtClean="0"/>
               <a:pPr/>
-              <a:t>8/11/2018</a:t>
+              <a:t>7/12/2019</a:t>
             </a:fld>
             <a:endParaRPr lang="en-US"/>
           </a:p>
@@ -1197,7 +1197,7 @@
             <a:fld id="{6E658DF8-B8C0-4C7F-85EB-B53A2DDD44A9}" type="datetimeFigureOut">
               <a:rPr lang="en-US" smtClean="0"/>
               <a:pPr/>
-              <a:t>8/11/2018</a:t>
+              <a:t>7/12/2019</a:t>
             </a:fld>
             <a:endParaRPr lang="en-US"/>
           </a:p>
@@ -1440,7 +1440,7 @@
             <a:fld id="{6E658DF8-B8C0-4C7F-85EB-B53A2DDD44A9}" type="datetimeFigureOut">
               <a:rPr lang="en-US" smtClean="0"/>
               <a:pPr/>
-              <a:t>8/11/2018</a:t>
+              <a:t>7/12/2019</a:t>
             </a:fld>
             <a:endParaRPr lang="en-US"/>
           </a:p>
@@ -1725,7 +1725,7 @@
             <a:fld id="{6E658DF8-B8C0-4C7F-85EB-B53A2DDD44A9}" type="datetimeFigureOut">
               <a:rPr lang="en-US" smtClean="0"/>
               <a:pPr/>
-              <a:t>8/11/2018</a:t>
+              <a:t>7/12/2019</a:t>
             </a:fld>
             <a:endParaRPr lang="en-US"/>
           </a:p>
@@ -2144,7 +2144,7 @@
             <a:fld id="{6E658DF8-B8C0-4C7F-85EB-B53A2DDD44A9}" type="datetimeFigureOut">
               <a:rPr lang="en-US" smtClean="0"/>
               <a:pPr/>
-              <a:t>8/11/2018</a:t>
+              <a:t>7/12/2019</a:t>
             </a:fld>
             <a:endParaRPr lang="en-US"/>
           </a:p>
@@ -2259,7 +2259,7 @@
             <a:fld id="{6E658DF8-B8C0-4C7F-85EB-B53A2DDD44A9}" type="datetimeFigureOut">
               <a:rPr lang="en-US" smtClean="0"/>
               <a:pPr/>
-              <a:t>8/11/2018</a:t>
+              <a:t>7/12/2019</a:t>
             </a:fld>
             <a:endParaRPr lang="en-US"/>
           </a:p>
@@ -2351,7 +2351,7 @@
             <a:fld id="{6E658DF8-B8C0-4C7F-85EB-B53A2DDD44A9}" type="datetimeFigureOut">
               <a:rPr lang="en-US" smtClean="0"/>
               <a:pPr/>
-              <a:t>8/11/2018</a:t>
+              <a:t>7/12/2019</a:t>
             </a:fld>
             <a:endParaRPr lang="en-US"/>
           </a:p>
@@ -2625,7 +2625,7 @@
             <a:fld id="{6E658DF8-B8C0-4C7F-85EB-B53A2DDD44A9}" type="datetimeFigureOut">
               <a:rPr lang="en-US" smtClean="0"/>
               <a:pPr/>
-              <a:t>8/11/2018</a:t>
+              <a:t>7/12/2019</a:t>
             </a:fld>
             <a:endParaRPr lang="en-US"/>
           </a:p>
@@ -2875,7 +2875,7 @@
             <a:fld id="{6E658DF8-B8C0-4C7F-85EB-B53A2DDD44A9}" type="datetimeFigureOut">
               <a:rPr lang="en-US" smtClean="0"/>
               <a:pPr/>
-              <a:t>8/11/2018</a:t>
+              <a:t>7/12/2019</a:t>
             </a:fld>
             <a:endParaRPr lang="en-US"/>
           </a:p>
@@ -3091,7 +3091,7 @@
             <a:fld id="{6E658DF8-B8C0-4C7F-85EB-B53A2DDD44A9}" type="datetimeFigureOut">
               <a:rPr lang="en-US" smtClean="0"/>
               <a:pPr/>
-              <a:t>8/11/2018</a:t>
+              <a:t>7/12/2019</a:t>
             </a:fld>
             <a:endParaRPr lang="en-US"/>
           </a:p>
@@ -3708,16 +3708,32 @@
             <p:ph idx="1"/>
           </p:nvPr>
         </p:nvSpPr>
-        <p:spPr/>
+        <p:spPr>
+          <a:xfrm>
+            <a:off x="457200" y="1600200"/>
+            <a:ext cx="6096000" cy="4525963"/>
+          </a:xfrm>
+        </p:spPr>
         <p:txBody>
           <a:bodyPr>
-            <a:normAutofit fontScale="92500" lnSpcReduction="20000"/>
+            <a:normAutofit fontScale="92500" lnSpcReduction="10000"/>
           </a:bodyPr>
           <a:lstStyle/>
           <a:p>
             <a:r>
               <a:rPr lang="en-IN" dirty="0" smtClean="0"/>
-              <a:t>It is part of java’s collection framework.</a:t>
+              <a:t>It is used as dynamic array and for sorting the elements.</a:t>
+            </a:r>
+            <a:endParaRPr lang="en-IN" dirty="0" smtClean="0"/>
+          </a:p>
+          <a:p>
+            <a:r>
+              <a:rPr lang="en-IN" dirty="0" smtClean="0"/>
+              <a:t>It </a:t>
+            </a:r>
+            <a:r>
+              <a:rPr lang="en-IN" dirty="0" smtClean="0"/>
+              <a:t>is part of java’s collection framework.</a:t>
             </a:r>
           </a:p>
           <a:p>
@@ -3751,29 +3767,49 @@
             </a:r>
             <a:r>
               <a:rPr lang="en-IN" dirty="0" smtClean="0"/>
-              <a:t> and implements List interface.</a:t>
-            </a:r>
-          </a:p>
-          <a:p>
+              <a:t> and implements List interface</a:t>
+            </a:r>
             <a:r>
               <a:rPr lang="en-IN" dirty="0" smtClean="0"/>
-              <a:t>It initialized with list size but it can grow and shrink.</a:t>
-            </a:r>
-          </a:p>
-          <a:p>
-            <a:r>
-              <a:rPr lang="en-IN" dirty="0" smtClean="0"/>
-              <a:t>It provides random access with elements.</a:t>
-            </a:r>
-          </a:p>
-          <a:p>
-            <a:r>
-              <a:rPr lang="en-IN" dirty="0" smtClean="0"/>
-              <a:t>Primitive Types not supported wrapper class can be used. </a:t>
-            </a:r>
-          </a:p>
-        </p:txBody>
-      </p:sp>
+              <a:t>.</a:t>
+            </a:r>
+            <a:endParaRPr lang="en-IN" dirty="0" smtClean="0"/>
+          </a:p>
+        </p:txBody>
+      </p:sp>
+      <p:pic>
+        <p:nvPicPr>
+          <p:cNvPr id="4" name="Picture 2"/>
+          <p:cNvPicPr>
+            <a:picLocks noChangeAspect="1" noChangeArrowheads="1"/>
+          </p:cNvPicPr>
+          <p:nvPr/>
+        </p:nvPicPr>
+        <p:blipFill>
+          <a:blip r:embed="rId2"/>
+          <a:srcRect/>
+          <a:stretch>
+            <a:fillRect/>
+          </a:stretch>
+        </p:blipFill>
+        <p:spPr bwMode="auto">
+          <a:xfrm>
+            <a:off x="6781800" y="1676400"/>
+            <a:ext cx="1933575" cy="3829050"/>
+          </a:xfrm>
+          <a:prstGeom prst="rect">
+            <a:avLst/>
+          </a:prstGeom>
+          <a:noFill/>
+          <a:ln w="9525">
+            <a:noFill/>
+            <a:miter lim="800000"/>
+            <a:headEnd/>
+            <a:tailEnd/>
+          </a:ln>
+          <a:effectLst/>
+        </p:spPr>
+      </p:pic>
     </p:spTree>
   </p:cSld>
   <p:clrMapOvr>
@@ -3818,198 +3854,140 @@
         </p:nvSpPr>
         <p:spPr/>
         <p:txBody>
-          <a:bodyPr/>
-          <a:lstStyle/>
-          <a:p>
-            <a:r>
-              <a:rPr lang="en-IN" dirty="0" smtClean="0"/>
-              <a:t>Syntax</a:t>
-            </a:r>
-            <a:endParaRPr lang="en-US" dirty="0"/>
-          </a:p>
-        </p:txBody>
-      </p:sp>
-      <p:sp>
-        <p:nvSpPr>
-          <p:cNvPr id="3" name="Content Placeholder 2"/>
-          <p:cNvSpPr>
-            <a:spLocks noGrp="1"/>
-          </p:cNvSpPr>
-          <p:nvPr>
-            <p:ph idx="1"/>
-          </p:nvPr>
-        </p:nvSpPr>
-        <p:spPr>
-          <a:xfrm>
-            <a:off x="457200" y="2514600"/>
-            <a:ext cx="8229600" cy="685800"/>
-          </a:xfrm>
-        </p:spPr>
-        <p:txBody>
           <a:bodyPr>
             <a:normAutofit/>
           </a:bodyPr>
           <a:lstStyle/>
           <a:p>
-            <a:pPr>
-              <a:buNone/>
-            </a:pPr>
-            <a:r>
-              <a:rPr lang="en-IN" sz="2900" dirty="0" err="1" smtClean="0"/>
-              <a:t>ArrayList</a:t>
-            </a:r>
-            <a:r>
-              <a:rPr lang="en-IN" sz="2900" dirty="0" smtClean="0"/>
-              <a:t>&lt;Type&gt; object = new </a:t>
-            </a:r>
-            <a:r>
-              <a:rPr lang="en-IN" sz="2900" dirty="0" err="1" smtClean="0"/>
-              <a:t>ArrayList</a:t>
-            </a:r>
-            <a:r>
-              <a:rPr lang="en-IN" sz="2900" dirty="0" smtClean="0"/>
-              <a:t>&lt;Type&gt;();</a:t>
-            </a:r>
-            <a:endParaRPr lang="en-US" sz="2900" dirty="0"/>
-          </a:p>
-        </p:txBody>
-      </p:sp>
-      <p:sp>
-        <p:nvSpPr>
-          <p:cNvPr id="4" name="Content Placeholder 2"/>
-          <p:cNvSpPr txBox="1">
-            <a:spLocks/>
-          </p:cNvSpPr>
-          <p:nvPr/>
+            <a:r>
+              <a:rPr lang="en-US" dirty="0" smtClean="0"/>
+              <a:t>Array List</a:t>
+            </a:r>
+            <a:endParaRPr lang="en-US" dirty="0"/>
+          </a:p>
+        </p:txBody>
+      </p:sp>
+      <p:sp>
+        <p:nvSpPr>
+          <p:cNvPr id="3" name="Content Placeholder 2"/>
+          <p:cNvSpPr>
+            <a:spLocks noGrp="1"/>
+          </p:cNvSpPr>
+          <p:nvPr>
+            <p:ph idx="1"/>
+          </p:nvPr>
         </p:nvSpPr>
         <p:spPr>
           <a:xfrm>
-            <a:off x="457200" y="3733800"/>
-            <a:ext cx="8229600" cy="685800"/>
+            <a:off x="457200" y="1600200"/>
+            <a:ext cx="6096000" cy="4525963"/>
+          </a:xfrm>
+        </p:spPr>
+        <p:txBody>
+          <a:bodyPr>
+            <a:normAutofit/>
+          </a:bodyPr>
+          <a:lstStyle/>
+          <a:p>
+            <a:r>
+              <a:rPr lang="en-IN" dirty="0" smtClean="0"/>
+              <a:t>It </a:t>
+            </a:r>
+            <a:r>
+              <a:rPr lang="en-IN" dirty="0" smtClean="0"/>
+              <a:t>initialized with list size but it can grow and shrink.</a:t>
+            </a:r>
+          </a:p>
+          <a:p>
+            <a:r>
+              <a:rPr lang="en-IN" dirty="0" smtClean="0"/>
+              <a:t>It provides random access with elements.</a:t>
+            </a:r>
+          </a:p>
+          <a:p>
+            <a:r>
+              <a:rPr lang="en-IN" dirty="0" smtClean="0"/>
+              <a:t>Primitive Types not </a:t>
+            </a:r>
+            <a:r>
+              <a:rPr lang="en-IN" dirty="0" smtClean="0"/>
+              <a:t>supported.</a:t>
+            </a:r>
+          </a:p>
+          <a:p>
+            <a:r>
+              <a:rPr lang="en-IN" dirty="0" smtClean="0"/>
+              <a:t>W</a:t>
+            </a:r>
+            <a:r>
+              <a:rPr lang="en-IN" dirty="0" smtClean="0"/>
+              <a:t>rapper </a:t>
+            </a:r>
+            <a:r>
+              <a:rPr lang="en-IN" dirty="0" smtClean="0"/>
+              <a:t>class can be </a:t>
+            </a:r>
+            <a:r>
+              <a:rPr lang="en-IN" dirty="0" smtClean="0"/>
+              <a:t>used instead of </a:t>
+            </a:r>
+            <a:r>
+              <a:rPr lang="en-IN" dirty="0" err="1" smtClean="0"/>
+              <a:t>primirives</a:t>
+            </a:r>
+            <a:r>
+              <a:rPr lang="en-IN" dirty="0" smtClean="0"/>
+              <a:t>. </a:t>
+            </a:r>
+            <a:endParaRPr lang="en-IN" dirty="0" smtClean="0"/>
+          </a:p>
+        </p:txBody>
+      </p:sp>
+      <p:pic>
+        <p:nvPicPr>
+          <p:cNvPr id="4" name="Picture 2"/>
+          <p:cNvPicPr>
+            <a:picLocks noChangeAspect="1" noChangeArrowheads="1"/>
+          </p:cNvPicPr>
+          <p:nvPr/>
+        </p:nvPicPr>
+        <p:blipFill>
+          <a:blip r:embed="rId2"/>
+          <a:srcRect/>
+          <a:stretch>
+            <a:fillRect/>
+          </a:stretch>
+        </p:blipFill>
+        <p:spPr bwMode="auto">
+          <a:xfrm>
+            <a:off x="6781800" y="1524000"/>
+            <a:ext cx="1933575" cy="3829050"/>
           </a:xfrm>
           <a:prstGeom prst="rect">
             <a:avLst/>
           </a:prstGeom>
+          <a:noFill/>
+          <a:ln w="9525">
+            <a:noFill/>
+            <a:miter lim="800000"/>
+            <a:headEnd/>
+            <a:tailEnd/>
+          </a:ln>
+          <a:effectLst/>
         </p:spPr>
-        <p:txBody>
-          <a:bodyPr vert="horz" lIns="91440" tIns="45720" rIns="91440" bIns="45720" rtlCol="0">
-            <a:normAutofit/>
-          </a:bodyPr>
-          <a:lstStyle/>
-          <a:p>
-            <a:pPr marL="342900" lvl="0" indent="-342900">
-              <a:spcBef>
-                <a:spcPct val="20000"/>
-              </a:spcBef>
-            </a:pPr>
-            <a:r>
-              <a:rPr kumimoji="0" lang="en-IN" sz="2900" b="0" i="0" u="none" strike="noStrike" kern="1200" cap="none" spc="0" normalizeH="0" baseline="0" noProof="0" dirty="0" err="1" smtClean="0">
-                <a:ln>
-                  <a:noFill/>
-                </a:ln>
-                <a:solidFill>
-                  <a:schemeClr val="tx1"/>
-                </a:solidFill>
-                <a:effectLst/>
-                <a:uLnTx/>
-                <a:uFillTx/>
-                <a:latin typeface="Cambria" pitchFamily="18" charset="0"/>
-                <a:ea typeface="+mn-ea"/>
-                <a:cs typeface="+mn-cs"/>
-              </a:rPr>
-              <a:t>ArrayList</a:t>
-            </a:r>
-            <a:r>
-              <a:rPr kumimoji="0" lang="en-IN" sz="2900" b="0" i="0" u="none" strike="noStrike" kern="1200" cap="none" spc="0" normalizeH="0" baseline="0" noProof="0" dirty="0" smtClean="0">
-                <a:ln>
-                  <a:noFill/>
-                </a:ln>
-                <a:solidFill>
-                  <a:schemeClr val="tx1"/>
-                </a:solidFill>
-                <a:effectLst/>
-                <a:uLnTx/>
-                <a:uFillTx/>
-                <a:latin typeface="Cambria" pitchFamily="18" charset="0"/>
-                <a:ea typeface="+mn-ea"/>
-                <a:cs typeface="+mn-cs"/>
-              </a:rPr>
-              <a:t>&lt;String&gt; </a:t>
-            </a:r>
-            <a:r>
-              <a:rPr kumimoji="0" lang="en-IN" sz="2900" b="0" i="0" u="none" strike="noStrike" kern="1200" cap="none" spc="0" normalizeH="0" baseline="0" noProof="0" dirty="0" err="1" smtClean="0">
-                <a:ln>
-                  <a:noFill/>
-                </a:ln>
-                <a:solidFill>
-                  <a:schemeClr val="tx1"/>
-                </a:solidFill>
-                <a:effectLst/>
-                <a:uLnTx/>
-                <a:uFillTx/>
-                <a:latin typeface="Cambria" pitchFamily="18" charset="0"/>
-                <a:ea typeface="+mn-ea"/>
-                <a:cs typeface="+mn-cs"/>
-              </a:rPr>
-              <a:t>aList</a:t>
-            </a:r>
-            <a:r>
-              <a:rPr kumimoji="0" lang="en-IN" sz="2900" b="0" i="0" u="none" strike="noStrike" kern="1200" cap="none" spc="0" normalizeH="0" baseline="0" noProof="0" dirty="0" smtClean="0">
-                <a:ln>
-                  <a:noFill/>
-                </a:ln>
-                <a:solidFill>
-                  <a:schemeClr val="tx1"/>
-                </a:solidFill>
-                <a:effectLst/>
-                <a:uLnTx/>
-                <a:uFillTx/>
-                <a:latin typeface="Cambria" pitchFamily="18" charset="0"/>
-                <a:ea typeface="+mn-ea"/>
-                <a:cs typeface="+mn-cs"/>
-              </a:rPr>
-              <a:t>= </a:t>
-            </a:r>
-            <a:r>
-              <a:rPr lang="en-IN" sz="2900" dirty="0" smtClean="0">
-                <a:latin typeface="Cambria" pitchFamily="18" charset="0"/>
-              </a:rPr>
-              <a:t>new </a:t>
-            </a:r>
-            <a:r>
-              <a:rPr lang="en-IN" sz="2900" dirty="0" err="1" smtClean="0">
-                <a:latin typeface="Cambria" pitchFamily="18" charset="0"/>
-              </a:rPr>
-              <a:t>ArrayList</a:t>
-            </a:r>
-            <a:r>
-              <a:rPr lang="en-IN" sz="2900" dirty="0" smtClean="0">
-                <a:latin typeface="Cambria" pitchFamily="18" charset="0"/>
-              </a:rPr>
-              <a:t>&lt;String&gt;();</a:t>
-            </a:r>
-            <a:endParaRPr kumimoji="0" lang="en-US" sz="2900" b="0" i="0" u="none" strike="noStrike" kern="1200" cap="none" spc="0" normalizeH="0" baseline="0" noProof="0" dirty="0">
-              <a:ln>
-                <a:noFill/>
-              </a:ln>
-              <a:solidFill>
-                <a:schemeClr val="tx1"/>
-              </a:solidFill>
-              <a:effectLst/>
-              <a:uLnTx/>
-              <a:uFillTx/>
-              <a:latin typeface="Cambria" pitchFamily="18" charset="0"/>
-              <a:ea typeface="+mn-ea"/>
-              <a:cs typeface="+mn-cs"/>
-            </a:endParaRPr>
-          </a:p>
-        </p:txBody>
-      </p:sp>
+      </p:pic>
     </p:spTree>
   </p:cSld>
   <p:clrMapOvr>
     <a:masterClrMapping/>
   </p:clrMapOvr>
+  <p:timing>
+    <p:tnLst>
+      <p:par>
+        <p:cTn id="1" dur="indefinite" restart="never" nodeType="tmRoot"/>
+      </p:par>
+    </p:tnLst>
+  </p:timing>
 </p:sld>
 </file>
 
@@ -4046,8 +4024,8 @@
           <a:lstStyle/>
           <a:p>
             <a:r>
-              <a:rPr lang="en-IN" dirty="0" err="1" smtClean="0"/>
-              <a:t>Constractor</a:t>
+              <a:rPr lang="en-IN" dirty="0" smtClean="0"/>
+              <a:t>Syntax</a:t>
             </a:r>
             <a:endParaRPr lang="en-US" dirty="0"/>
           </a:p>
@@ -4063,97 +4041,169 @@
             <p:ph idx="1"/>
           </p:nvPr>
         </p:nvSpPr>
-        <p:spPr/>
-        <p:txBody>
-          <a:bodyPr/>
-          <a:lstStyle/>
-          <a:p>
-            <a:r>
-              <a:rPr lang="en-IN" dirty="0" err="1" smtClean="0"/>
+        <p:spPr>
+          <a:xfrm>
+            <a:off x="457200" y="2514600"/>
+            <a:ext cx="8229600" cy="685800"/>
+          </a:xfrm>
+        </p:spPr>
+        <p:txBody>
+          <a:bodyPr>
+            <a:normAutofit/>
+          </a:bodyPr>
+          <a:lstStyle/>
+          <a:p>
+            <a:pPr>
+              <a:buNone/>
+            </a:pPr>
+            <a:r>
+              <a:rPr lang="en-IN" sz="2900" dirty="0" err="1" smtClean="0"/>
               <a:t>ArrayList</a:t>
             </a:r>
             <a:r>
-              <a:rPr lang="en-IN" dirty="0" smtClean="0"/>
-              <a:t>()</a:t>
-            </a:r>
-          </a:p>
-          <a:p>
-            <a:pPr lvl="1"/>
-            <a:r>
-              <a:rPr lang="en-IN" dirty="0" smtClean="0"/>
-              <a:t>Provides empty </a:t>
-            </a:r>
-            <a:r>
-              <a:rPr lang="en-IN" dirty="0" err="1" smtClean="0"/>
-              <a:t>arraylist</a:t>
-            </a:r>
-            <a:endParaRPr lang="en-IN" dirty="0" smtClean="0"/>
-          </a:p>
-          <a:p>
-            <a:r>
-              <a:rPr lang="en-IN" dirty="0" err="1" smtClean="0"/>
+              <a:rPr lang="en-IN" sz="2900" dirty="0" smtClean="0"/>
+              <a:t>&lt;Type&gt; object = new </a:t>
+            </a:r>
+            <a:r>
+              <a:rPr lang="en-IN" sz="2900" dirty="0" err="1" smtClean="0"/>
               <a:t>ArrayList</a:t>
             </a:r>
             <a:r>
-              <a:rPr lang="en-IN" dirty="0" smtClean="0"/>
-              <a:t>(Collection c)</a:t>
-            </a:r>
-          </a:p>
-          <a:p>
-            <a:pPr lvl="1"/>
-            <a:r>
-              <a:rPr lang="en-IN" dirty="0" smtClean="0"/>
-              <a:t>Provides </a:t>
-            </a:r>
-            <a:r>
-              <a:rPr lang="en-IN" dirty="0" err="1" smtClean="0"/>
-              <a:t>arraylist</a:t>
-            </a:r>
-            <a:r>
-              <a:rPr lang="en-IN" dirty="0" smtClean="0"/>
-              <a:t> built with collection elements.</a:t>
-            </a:r>
-          </a:p>
-          <a:p>
-            <a:r>
-              <a:rPr lang="en-IN" dirty="0" err="1" smtClean="0"/>
+              <a:rPr lang="en-IN" sz="2900" dirty="0" smtClean="0"/>
+              <a:t>&lt;Type&gt;();</a:t>
+            </a:r>
+            <a:endParaRPr lang="en-US" sz="2900" dirty="0"/>
+          </a:p>
+        </p:txBody>
+      </p:sp>
+      <p:sp>
+        <p:nvSpPr>
+          <p:cNvPr id="4" name="Content Placeholder 2"/>
+          <p:cNvSpPr txBox="1">
+            <a:spLocks/>
+          </p:cNvSpPr>
+          <p:nvPr/>
+        </p:nvSpPr>
+        <p:spPr>
+          <a:xfrm>
+            <a:off x="457200" y="3733800"/>
+            <a:ext cx="8229600" cy="685800"/>
+          </a:xfrm>
+          <a:prstGeom prst="rect">
+            <a:avLst/>
+          </a:prstGeom>
+        </p:spPr>
+        <p:txBody>
+          <a:bodyPr vert="horz" lIns="91440" tIns="45720" rIns="91440" bIns="45720" rtlCol="0">
+            <a:normAutofit/>
+          </a:bodyPr>
+          <a:lstStyle/>
+          <a:p>
+            <a:pPr marL="342900" lvl="0" indent="-342900">
+              <a:spcBef>
+                <a:spcPct val="20000"/>
+              </a:spcBef>
+            </a:pPr>
+            <a:r>
+              <a:rPr kumimoji="0" lang="en-IN" sz="2900" b="0" i="0" u="none" strike="noStrike" kern="1200" cap="none" spc="0" normalizeH="0" baseline="0" noProof="0" dirty="0" err="1" smtClean="0">
+                <a:ln>
+                  <a:noFill/>
+                </a:ln>
+                <a:solidFill>
+                  <a:schemeClr val="tx1"/>
+                </a:solidFill>
+                <a:effectLst/>
+                <a:uLnTx/>
+                <a:uFillTx/>
+                <a:latin typeface="Cambria" pitchFamily="18" charset="0"/>
+                <a:ea typeface="+mn-ea"/>
+                <a:cs typeface="+mn-cs"/>
+              </a:rPr>
               <a:t>ArrayList</a:t>
             </a:r>
             <a:r>
-              <a:rPr lang="en-IN" dirty="0" smtClean="0"/>
-              <a:t>(</a:t>
-            </a:r>
-            <a:r>
-              <a:rPr lang="en-IN" dirty="0" err="1" smtClean="0"/>
-              <a:t>int</a:t>
-            </a:r>
-            <a:r>
-              <a:rPr lang="en-IN" dirty="0" smtClean="0"/>
-              <a:t> size)</a:t>
-            </a:r>
-          </a:p>
-          <a:p>
-            <a:pPr lvl="1"/>
-            <a:r>
-              <a:rPr lang="en-IN" dirty="0" smtClean="0"/>
-              <a:t>Built based on required size.</a:t>
-            </a:r>
-          </a:p>
-          <a:p>
-            <a:pPr lvl="1"/>
-            <a:r>
-              <a:rPr lang="en-IN" dirty="0" smtClean="0"/>
-              <a:t>It can grow and </a:t>
-            </a:r>
-            <a:r>
-              <a:rPr lang="en-IN" dirty="0" err="1" smtClean="0"/>
-              <a:t>shirnk</a:t>
-            </a:r>
-            <a:r>
-              <a:rPr lang="en-IN" dirty="0" smtClean="0"/>
-              <a:t>. </a:t>
-            </a:r>
-            <a:endParaRPr lang="en-US" dirty="0"/>
+              <a:rPr kumimoji="0" lang="en-IN" sz="2900" b="0" i="0" u="none" strike="noStrike" kern="1200" cap="none" spc="0" normalizeH="0" baseline="0" noProof="0" dirty="0" smtClean="0">
+                <a:ln>
+                  <a:noFill/>
+                </a:ln>
+                <a:solidFill>
+                  <a:schemeClr val="tx1"/>
+                </a:solidFill>
+                <a:effectLst/>
+                <a:uLnTx/>
+                <a:uFillTx/>
+                <a:latin typeface="Cambria" pitchFamily="18" charset="0"/>
+                <a:ea typeface="+mn-ea"/>
+                <a:cs typeface="+mn-cs"/>
+              </a:rPr>
+              <a:t>&lt;String&gt; </a:t>
+            </a:r>
+            <a:r>
+              <a:rPr kumimoji="0" lang="en-IN" sz="2900" b="0" i="0" u="none" strike="noStrike" kern="1200" cap="none" spc="0" normalizeH="0" baseline="0" noProof="0" dirty="0" err="1" smtClean="0">
+                <a:ln>
+                  <a:noFill/>
+                </a:ln>
+                <a:solidFill>
+                  <a:schemeClr val="tx1"/>
+                </a:solidFill>
+                <a:effectLst/>
+                <a:uLnTx/>
+                <a:uFillTx/>
+                <a:latin typeface="Cambria" pitchFamily="18" charset="0"/>
+                <a:ea typeface="+mn-ea"/>
+                <a:cs typeface="+mn-cs"/>
+              </a:rPr>
+              <a:t>aList</a:t>
+            </a:r>
+            <a:r>
+              <a:rPr kumimoji="0" lang="en-IN" sz="2900" b="0" i="0" u="none" strike="noStrike" kern="1200" cap="none" spc="0" normalizeH="0" baseline="0" noProof="0" dirty="0" smtClean="0">
+                <a:ln>
+                  <a:noFill/>
+                </a:ln>
+                <a:solidFill>
+                  <a:schemeClr val="tx1"/>
+                </a:solidFill>
+                <a:effectLst/>
+                <a:uLnTx/>
+                <a:uFillTx/>
+                <a:latin typeface="Cambria" pitchFamily="18" charset="0"/>
+                <a:ea typeface="+mn-ea"/>
+                <a:cs typeface="+mn-cs"/>
+              </a:rPr>
+              <a:t>= </a:t>
+            </a:r>
+            <a:r>
+              <a:rPr lang="en-IN" sz="2900" dirty="0" smtClean="0">
+                <a:latin typeface="Cambria" pitchFamily="18" charset="0"/>
+              </a:rPr>
+              <a:t>new </a:t>
+            </a:r>
+            <a:r>
+              <a:rPr lang="en-IN" sz="2900" dirty="0" err="1" smtClean="0">
+                <a:latin typeface="Cambria" pitchFamily="18" charset="0"/>
+              </a:rPr>
+              <a:t>ArrayList</a:t>
+            </a:r>
+            <a:r>
+              <a:rPr lang="en-IN" sz="2900" dirty="0" smtClean="0">
+                <a:latin typeface="Cambria" pitchFamily="18" charset="0"/>
+              </a:rPr>
+              <a:t>&lt;String&gt;();</a:t>
+            </a:r>
+            <a:endParaRPr kumimoji="0" lang="en-US" sz="2900" b="0" i="0" u="none" strike="noStrike" kern="1200" cap="none" spc="0" normalizeH="0" baseline="0" noProof="0" dirty="0">
+              <a:ln>
+                <a:noFill/>
+              </a:ln>
+              <a:solidFill>
+                <a:schemeClr val="tx1"/>
+              </a:solidFill>
+              <a:effectLst/>
+              <a:uLnTx/>
+              <a:uFillTx/>
+              <a:latin typeface="Cambria" pitchFamily="18" charset="0"/>
+              <a:ea typeface="+mn-ea"/>
+              <a:cs typeface="+mn-cs"/>
+            </a:endParaRPr>
           </a:p>
         </p:txBody>
       </p:sp>
@@ -4162,6 +4212,13 @@
   <p:clrMapOvr>
     <a:masterClrMapping/>
   </p:clrMapOvr>
+  <p:timing>
+    <p:tnLst>
+      <p:par>
+        <p:cTn id="1" dur="indefinite" restart="never" nodeType="tmRoot"/>
+      </p:par>
+    </p:tnLst>
+  </p:timing>
 </p:sld>
 </file>
 
@@ -4364,6 +4421,13 @@
   <p:clrMapOvr>
     <a:masterClrMapping/>
   </p:clrMapOvr>
+  <p:timing>
+    <p:tnLst>
+      <p:par>
+        <p:cTn id="1" dur="indefinite" restart="never" nodeType="tmRoot"/>
+      </p:par>
+    </p:tnLst>
+  </p:timing>
 </p:sld>
 </file>
 
@@ -4601,6 +4665,13 @@
   <p:clrMapOvr>
     <a:masterClrMapping/>
   </p:clrMapOvr>
+  <p:timing>
+    <p:tnLst>
+      <p:par>
+        <p:cTn id="1" dur="indefinite" restart="never" nodeType="tmRoot"/>
+      </p:par>
+    </p:tnLst>
+  </p:timing>
 </p:sld>
 </file>
 

</xml_diff>